<commit_message>
update arrow on slides
</commit_message>
<xml_diff>
--- a/1phase/data_stucts/HTC-nested-data-structures.pptx
+++ b/1phase/data_stucts/HTC-nested-data-structures.pptx
@@ -250,7 +250,7 @@
           <a:p>
             <a:fld id="{CAA47771-BE1A-0F41-A2AB-502D986D5C71}" type="datetimeFigureOut">
               <a:rPr lang="en-US" smtClean="0"/>
-              <a:t>3/18/15</a:t>
+              <a:t>8/19/15</a:t>
             </a:fld>
             <a:endParaRPr lang="en-US"/>
           </a:p>
@@ -416,7 +416,7 @@
           <a:p>
             <a:fld id="{4083CDE4-3FA1-6A4B-862D-E61F193A4941}" type="datetimeFigureOut">
               <a:rPr lang="en-US" smtClean="0"/>
-              <a:t>3/18/15</a:t>
+              <a:t>8/19/15</a:t>
             </a:fld>
             <a:endParaRPr lang="en-US"/>
           </a:p>
@@ -9047,8 +9047,8 @@
         </p:nvSpPr>
         <p:spPr>
           <a:xfrm>
-            <a:off x="1836163" y="1766546"/>
-            <a:ext cx="5471674" cy="3282730"/>
+            <a:off x="3155207" y="2725365"/>
+            <a:ext cx="2311865" cy="1396431"/>
           </a:xfrm>
           <a:prstGeom prst="rightArrow">
             <a:avLst/>
@@ -9459,14 +9459,205 @@
       </p:grpSpPr>
       <p:sp>
         <p:nvSpPr>
-          <p:cNvPr id="7" name="Right Arrow 6"/>
+          <p:cNvPr id="2" name="Title 1"/>
+          <p:cNvSpPr>
+            <a:spLocks noGrp="1"/>
+          </p:cNvSpPr>
+          <p:nvPr>
+            <p:ph type="title"/>
+          </p:nvPr>
+        </p:nvSpPr>
+        <p:spPr/>
+        <p:txBody>
+          <a:bodyPr/>
+          <a:lstStyle/>
+          <a:p>
+            <a:r>
+              <a:rPr lang="en-US" dirty="0" smtClean="0"/>
+              <a:t>Creating the Structure</a:t>
+            </a:r>
+            <a:endParaRPr lang="en-US" dirty="0"/>
+          </a:p>
+        </p:txBody>
+      </p:sp>
+      <p:sp>
+        <p:nvSpPr>
+          <p:cNvPr id="5" name="Content Placeholder 4"/>
+          <p:cNvSpPr>
+            <a:spLocks noGrp="1"/>
+          </p:cNvSpPr>
+          <p:nvPr>
+            <p:ph sz="half" idx="1"/>
+          </p:nvPr>
+        </p:nvSpPr>
+        <p:spPr>
+          <a:xfrm>
+            <a:off x="1104458" y="1865377"/>
+            <a:ext cx="2245733" cy="4158166"/>
+          </a:xfrm>
+        </p:spPr>
+        <p:txBody>
+          <a:bodyPr/>
+          <a:lstStyle/>
+          <a:p>
+            <a:r>
+              <a:rPr lang="en-US" dirty="0" smtClean="0"/>
+              <a:t>provided =</a:t>
+            </a:r>
+          </a:p>
+          <a:p>
+            <a:endParaRPr lang="en-US" dirty="0"/>
+          </a:p>
+          <a:p>
+            <a:r>
+              <a:rPr lang="en-US" dirty="0" smtClean="0"/>
+              <a:t>[ [:a, :b, :c],</a:t>
+            </a:r>
+          </a:p>
+          <a:p>
+            <a:r>
+              <a:rPr lang="en-US" dirty="0"/>
+              <a:t> </a:t>
+            </a:r>
+            <a:r>
+              <a:rPr lang="en-US" dirty="0" smtClean="0"/>
+              <a:t> [:d, :e, :f],</a:t>
+            </a:r>
+          </a:p>
+          <a:p>
+            <a:r>
+              <a:rPr lang="en-US" dirty="0"/>
+              <a:t> </a:t>
+            </a:r>
+            <a:r>
+              <a:rPr lang="en-US" dirty="0" smtClean="0"/>
+              <a:t> [:g, :h, :</a:t>
+            </a:r>
+            <a:r>
+              <a:rPr lang="en-US" dirty="0" err="1"/>
+              <a:t>i</a:t>
+            </a:r>
+            <a:r>
+              <a:rPr lang="en-US" dirty="0" smtClean="0"/>
+              <a:t>],</a:t>
+            </a:r>
+          </a:p>
+          <a:p>
+            <a:r>
+              <a:rPr lang="en-US" dirty="0"/>
+              <a:t> </a:t>
+            </a:r>
+            <a:r>
+              <a:rPr lang="en-US" dirty="0" smtClean="0"/>
+              <a:t> [:j, :k, :l],</a:t>
+            </a:r>
+          </a:p>
+          <a:p>
+            <a:r>
+              <a:rPr lang="en-US" dirty="0"/>
+              <a:t> </a:t>
+            </a:r>
+            <a:r>
+              <a:rPr lang="en-US" dirty="0" smtClean="0"/>
+              <a:t> [:m, :n, :o],</a:t>
+            </a:r>
+          </a:p>
+          <a:p>
+            <a:r>
+              <a:rPr lang="en-US" dirty="0"/>
+              <a:t> </a:t>
+            </a:r>
+            <a:r>
+              <a:rPr lang="en-US" dirty="0" smtClean="0"/>
+              <a:t> [:p, :q, :r],</a:t>
+            </a:r>
+          </a:p>
+          <a:p>
+            <a:r>
+              <a:rPr lang="en-US" dirty="0" smtClean="0"/>
+              <a:t>  [:s, :t, :u],</a:t>
+            </a:r>
+          </a:p>
+          <a:p>
+            <a:r>
+              <a:rPr lang="en-US" dirty="0"/>
+              <a:t> </a:t>
+            </a:r>
+            <a:r>
+              <a:rPr lang="en-US" dirty="0" smtClean="0"/>
+              <a:t> [:v, :w, :x],</a:t>
+            </a:r>
+          </a:p>
+          <a:p>
+            <a:r>
+              <a:rPr lang="en-US" dirty="0"/>
+              <a:t> </a:t>
+            </a:r>
+            <a:r>
+              <a:rPr lang="en-US" dirty="0" smtClean="0"/>
+              <a:t> [:y, :z, :A] ] </a:t>
+            </a:r>
+            <a:endParaRPr lang="en-US" dirty="0"/>
+          </a:p>
+        </p:txBody>
+      </p:sp>
+      <p:sp>
+        <p:nvSpPr>
+          <p:cNvPr id="6" name="Content Placeholder 5"/>
+          <p:cNvSpPr>
+            <a:spLocks noGrp="1"/>
+          </p:cNvSpPr>
+          <p:nvPr>
+            <p:ph sz="half" idx="2"/>
+          </p:nvPr>
+        </p:nvSpPr>
+        <p:spPr>
+          <a:xfrm>
+            <a:off x="5467072" y="1865377"/>
+            <a:ext cx="2566525" cy="4158166"/>
+          </a:xfrm>
+        </p:spPr>
+        <p:txBody>
+          <a:bodyPr/>
+          <a:lstStyle/>
+          <a:p>
+            <a:endParaRPr lang="en-US" dirty="0"/>
+          </a:p>
+        </p:txBody>
+      </p:sp>
+      <p:sp>
+        <p:nvSpPr>
+          <p:cNvPr id="4" name="Footer Placeholder 3"/>
+          <p:cNvSpPr>
+            <a:spLocks noGrp="1"/>
+          </p:cNvSpPr>
+          <p:nvPr>
+            <p:ph type="ftr" sz="quarter" idx="3"/>
+          </p:nvPr>
+        </p:nvSpPr>
+        <p:spPr/>
+        <p:txBody>
+          <a:bodyPr/>
+          <a:lstStyle/>
+          <a:p>
+            <a:r>
+              <a:rPr lang="en-US" smtClean="0"/>
+              <a:t>Nested Data Structures: Arrays and Hashes</a:t>
+            </a:r>
+            <a:endParaRPr lang="en-US" dirty="0"/>
+          </a:p>
+        </p:txBody>
+      </p:sp>
+      <p:sp>
+        <p:nvSpPr>
+          <p:cNvPr id="8" name="Right Arrow 7"/>
           <p:cNvSpPr/>
           <p:nvPr/>
         </p:nvSpPr>
         <p:spPr>
           <a:xfrm>
-            <a:off x="1836163" y="1766546"/>
-            <a:ext cx="5471674" cy="3282730"/>
+            <a:off x="3155207" y="2725365"/>
+            <a:ext cx="2311865" cy="1396431"/>
           </a:xfrm>
           <a:prstGeom prst="rightArrow">
             <a:avLst/>
@@ -9502,197 +9693,6 @@
           <a:p>
             <a:pPr algn="ctr"/>
             <a:endParaRPr lang="en-US"/>
-          </a:p>
-        </p:txBody>
-      </p:sp>
-      <p:sp>
-        <p:nvSpPr>
-          <p:cNvPr id="2" name="Title 1"/>
-          <p:cNvSpPr>
-            <a:spLocks noGrp="1"/>
-          </p:cNvSpPr>
-          <p:nvPr>
-            <p:ph type="title"/>
-          </p:nvPr>
-        </p:nvSpPr>
-        <p:spPr/>
-        <p:txBody>
-          <a:bodyPr/>
-          <a:lstStyle/>
-          <a:p>
-            <a:r>
-              <a:rPr lang="en-US" dirty="0" smtClean="0"/>
-              <a:t>Creating the Structure</a:t>
-            </a:r>
-            <a:endParaRPr lang="en-US" dirty="0"/>
-          </a:p>
-        </p:txBody>
-      </p:sp>
-      <p:sp>
-        <p:nvSpPr>
-          <p:cNvPr id="5" name="Content Placeholder 4"/>
-          <p:cNvSpPr>
-            <a:spLocks noGrp="1"/>
-          </p:cNvSpPr>
-          <p:nvPr>
-            <p:ph sz="half" idx="1"/>
-          </p:nvPr>
-        </p:nvSpPr>
-        <p:spPr>
-          <a:xfrm>
-            <a:off x="1104458" y="1865377"/>
-            <a:ext cx="2245733" cy="4158166"/>
-          </a:xfrm>
-        </p:spPr>
-        <p:txBody>
-          <a:bodyPr/>
-          <a:lstStyle/>
-          <a:p>
-            <a:r>
-              <a:rPr lang="en-US" dirty="0" smtClean="0"/>
-              <a:t>provided =</a:t>
-            </a:r>
-          </a:p>
-          <a:p>
-            <a:endParaRPr lang="en-US" dirty="0"/>
-          </a:p>
-          <a:p>
-            <a:r>
-              <a:rPr lang="en-US" dirty="0" smtClean="0"/>
-              <a:t>[ [:a, :b, :c],</a:t>
-            </a:r>
-          </a:p>
-          <a:p>
-            <a:r>
-              <a:rPr lang="en-US" dirty="0"/>
-              <a:t> </a:t>
-            </a:r>
-            <a:r>
-              <a:rPr lang="en-US" dirty="0" smtClean="0"/>
-              <a:t> [:d, :e, :f],</a:t>
-            </a:r>
-          </a:p>
-          <a:p>
-            <a:r>
-              <a:rPr lang="en-US" dirty="0"/>
-              <a:t> </a:t>
-            </a:r>
-            <a:r>
-              <a:rPr lang="en-US" dirty="0" smtClean="0"/>
-              <a:t> [:g, :h, :</a:t>
-            </a:r>
-            <a:r>
-              <a:rPr lang="en-US" dirty="0" err="1"/>
-              <a:t>i</a:t>
-            </a:r>
-            <a:r>
-              <a:rPr lang="en-US" dirty="0" smtClean="0"/>
-              <a:t>],</a:t>
-            </a:r>
-          </a:p>
-          <a:p>
-            <a:r>
-              <a:rPr lang="en-US" dirty="0"/>
-              <a:t> </a:t>
-            </a:r>
-            <a:r>
-              <a:rPr lang="en-US" dirty="0" smtClean="0"/>
-              <a:t> [:j, :k, :l],</a:t>
-            </a:r>
-          </a:p>
-          <a:p>
-            <a:r>
-              <a:rPr lang="en-US" dirty="0"/>
-              <a:t> </a:t>
-            </a:r>
-            <a:r>
-              <a:rPr lang="en-US" dirty="0" smtClean="0"/>
-              <a:t> [:m, :n, :o],</a:t>
-            </a:r>
-          </a:p>
-          <a:p>
-            <a:r>
-              <a:rPr lang="en-US" dirty="0"/>
-              <a:t> </a:t>
-            </a:r>
-            <a:r>
-              <a:rPr lang="en-US" dirty="0" smtClean="0"/>
-              <a:t> [:p, :q, :r],</a:t>
-            </a:r>
-          </a:p>
-          <a:p>
-            <a:r>
-              <a:rPr lang="en-US" dirty="0" smtClean="0"/>
-              <a:t>  [:s, :t, :u],</a:t>
-            </a:r>
-          </a:p>
-          <a:p>
-            <a:r>
-              <a:rPr lang="en-US" dirty="0"/>
-              <a:t> </a:t>
-            </a:r>
-            <a:r>
-              <a:rPr lang="en-US" dirty="0" smtClean="0"/>
-              <a:t> [:v, :w, :x],</a:t>
-            </a:r>
-          </a:p>
-          <a:p>
-            <a:r>
-              <a:rPr lang="en-US" dirty="0"/>
-              <a:t> </a:t>
-            </a:r>
-            <a:r>
-              <a:rPr lang="en-US" dirty="0" smtClean="0"/>
-              <a:t> [:y, :z, :A] ] </a:t>
-            </a:r>
-            <a:endParaRPr lang="en-US" dirty="0"/>
-          </a:p>
-        </p:txBody>
-      </p:sp>
-      <p:sp>
-        <p:nvSpPr>
-          <p:cNvPr id="6" name="Content Placeholder 5"/>
-          <p:cNvSpPr>
-            <a:spLocks noGrp="1"/>
-          </p:cNvSpPr>
-          <p:nvPr>
-            <p:ph sz="half" idx="2"/>
-          </p:nvPr>
-        </p:nvSpPr>
-        <p:spPr>
-          <a:xfrm>
-            <a:off x="5467072" y="1865377"/>
-            <a:ext cx="2566525" cy="4158166"/>
-          </a:xfrm>
-        </p:spPr>
-        <p:txBody>
-          <a:bodyPr/>
-          <a:lstStyle/>
-          <a:p>
-            <a:endParaRPr lang="en-US" dirty="0"/>
-          </a:p>
-        </p:txBody>
-      </p:sp>
-      <p:sp>
-        <p:nvSpPr>
-          <p:cNvPr id="4" name="Footer Placeholder 3"/>
-          <p:cNvSpPr>
-            <a:spLocks noGrp="1"/>
-          </p:cNvSpPr>
-          <p:nvPr>
-            <p:ph type="ftr" sz="quarter" idx="3"/>
-          </p:nvPr>
-        </p:nvSpPr>
-        <p:spPr/>
-        <p:txBody>
-          <a:bodyPr/>
-          <a:lstStyle/>
-          <a:p>
-            <a:r>
-              <a:rPr lang="en-US" smtClean="0"/>
-              <a:t>Nested Data Structures: Arrays and Hashes</a:t>
-            </a:r>
-            <a:endParaRPr lang="en-US" dirty="0"/>
           </a:p>
         </p:txBody>
       </p:sp>
@@ -9735,14 +9735,238 @@
       </p:grpSpPr>
       <p:sp>
         <p:nvSpPr>
-          <p:cNvPr id="7" name="Right Arrow 6"/>
+          <p:cNvPr id="2" name="Title 1"/>
+          <p:cNvSpPr>
+            <a:spLocks noGrp="1"/>
+          </p:cNvSpPr>
+          <p:nvPr>
+            <p:ph type="title"/>
+          </p:nvPr>
+        </p:nvSpPr>
+        <p:spPr/>
+        <p:txBody>
+          <a:bodyPr/>
+          <a:lstStyle/>
+          <a:p>
+            <a:r>
+              <a:rPr lang="en-US" dirty="0" smtClean="0"/>
+              <a:t>Creating the Structure</a:t>
+            </a:r>
+            <a:endParaRPr lang="en-US" dirty="0"/>
+          </a:p>
+        </p:txBody>
+      </p:sp>
+      <p:sp>
+        <p:nvSpPr>
+          <p:cNvPr id="5" name="Content Placeholder 4"/>
+          <p:cNvSpPr>
+            <a:spLocks noGrp="1"/>
+          </p:cNvSpPr>
+          <p:nvPr>
+            <p:ph sz="half" idx="1"/>
+          </p:nvPr>
+        </p:nvSpPr>
+        <p:spPr>
+          <a:xfrm>
+            <a:off x="1104458" y="1865377"/>
+            <a:ext cx="2245733" cy="4158166"/>
+          </a:xfrm>
+        </p:spPr>
+        <p:txBody>
+          <a:bodyPr/>
+          <a:lstStyle/>
+          <a:p>
+            <a:r>
+              <a:rPr lang="en-US" dirty="0" smtClean="0"/>
+              <a:t>provided =</a:t>
+            </a:r>
+          </a:p>
+          <a:p>
+            <a:endParaRPr lang="en-US" dirty="0"/>
+          </a:p>
+          <a:p>
+            <a:r>
+              <a:rPr lang="en-US" dirty="0" smtClean="0"/>
+              <a:t>[ [:a, :b, :c],</a:t>
+            </a:r>
+          </a:p>
+          <a:p>
+            <a:r>
+              <a:rPr lang="en-US" dirty="0"/>
+              <a:t> </a:t>
+            </a:r>
+            <a:r>
+              <a:rPr lang="en-US" dirty="0" smtClean="0"/>
+              <a:t> [:d, :e, :f],</a:t>
+            </a:r>
+          </a:p>
+          <a:p>
+            <a:r>
+              <a:rPr lang="en-US" dirty="0"/>
+              <a:t> </a:t>
+            </a:r>
+            <a:r>
+              <a:rPr lang="en-US" dirty="0" smtClean="0"/>
+              <a:t> [:g, :h, :</a:t>
+            </a:r>
+            <a:r>
+              <a:rPr lang="en-US" dirty="0" err="1"/>
+              <a:t>i</a:t>
+            </a:r>
+            <a:r>
+              <a:rPr lang="en-US" dirty="0" smtClean="0"/>
+              <a:t>],</a:t>
+            </a:r>
+          </a:p>
+          <a:p>
+            <a:r>
+              <a:rPr lang="en-US" dirty="0"/>
+              <a:t> </a:t>
+            </a:r>
+            <a:r>
+              <a:rPr lang="en-US" dirty="0" smtClean="0"/>
+              <a:t> [:j, :k, :l],</a:t>
+            </a:r>
+          </a:p>
+          <a:p>
+            <a:r>
+              <a:rPr lang="en-US" dirty="0"/>
+              <a:t> </a:t>
+            </a:r>
+            <a:r>
+              <a:rPr lang="en-US" dirty="0" smtClean="0"/>
+              <a:t> [:m, :n, :o],</a:t>
+            </a:r>
+          </a:p>
+          <a:p>
+            <a:r>
+              <a:rPr lang="en-US" dirty="0"/>
+              <a:t> </a:t>
+            </a:r>
+            <a:r>
+              <a:rPr lang="en-US" dirty="0" smtClean="0"/>
+              <a:t> [:p, :q, :r],</a:t>
+            </a:r>
+          </a:p>
+          <a:p>
+            <a:r>
+              <a:rPr lang="en-US" dirty="0" smtClean="0"/>
+              <a:t>  [:s, :t, :u],</a:t>
+            </a:r>
+          </a:p>
+          <a:p>
+            <a:r>
+              <a:rPr lang="en-US" dirty="0"/>
+              <a:t> </a:t>
+            </a:r>
+            <a:r>
+              <a:rPr lang="en-US" dirty="0" smtClean="0"/>
+              <a:t> [:v, :w, :x],</a:t>
+            </a:r>
+          </a:p>
+          <a:p>
+            <a:r>
+              <a:rPr lang="en-US" dirty="0"/>
+              <a:t> </a:t>
+            </a:r>
+            <a:r>
+              <a:rPr lang="en-US" dirty="0" smtClean="0"/>
+              <a:t> [:y, :z, :A] ] </a:t>
+            </a:r>
+            <a:endParaRPr lang="en-US" dirty="0"/>
+          </a:p>
+        </p:txBody>
+      </p:sp>
+      <p:sp>
+        <p:nvSpPr>
+          <p:cNvPr id="6" name="Content Placeholder 5"/>
+          <p:cNvSpPr>
+            <a:spLocks noGrp="1"/>
+          </p:cNvSpPr>
+          <p:nvPr>
+            <p:ph sz="half" idx="2"/>
+          </p:nvPr>
+        </p:nvSpPr>
+        <p:spPr>
+          <a:xfrm>
+            <a:off x="5467072" y="1865377"/>
+            <a:ext cx="2566525" cy="4158166"/>
+          </a:xfrm>
+        </p:spPr>
+        <p:txBody>
+          <a:bodyPr/>
+          <a:lstStyle/>
+          <a:p>
+            <a:r>
+              <a:rPr lang="en-US" dirty="0" smtClean="0"/>
+              <a:t>desired =</a:t>
+            </a:r>
+          </a:p>
+          <a:p>
+            <a:endParaRPr lang="en-US" dirty="0" smtClean="0"/>
+          </a:p>
+          <a:p>
+            <a:r>
+              <a:rPr lang="en-US" dirty="0" smtClean="0"/>
+              <a:t>[ [nil, nil, nil],</a:t>
+            </a:r>
+          </a:p>
+          <a:p>
+            <a:r>
+              <a:rPr lang="en-US" dirty="0"/>
+              <a:t> </a:t>
+            </a:r>
+            <a:r>
+              <a:rPr lang="en-US" dirty="0" smtClean="0"/>
+              <a:t> [nil, nil, nil],</a:t>
+            </a:r>
+          </a:p>
+          <a:p>
+            <a:r>
+              <a:rPr lang="en-US" dirty="0"/>
+              <a:t> </a:t>
+            </a:r>
+            <a:r>
+              <a:rPr lang="en-US" dirty="0" smtClean="0"/>
+              <a:t> [nil, nil, nil] ]</a:t>
+            </a:r>
+            <a:endParaRPr lang="en-US" dirty="0"/>
+          </a:p>
+        </p:txBody>
+      </p:sp>
+      <p:sp>
+        <p:nvSpPr>
+          <p:cNvPr id="4" name="Footer Placeholder 3"/>
+          <p:cNvSpPr>
+            <a:spLocks noGrp="1"/>
+          </p:cNvSpPr>
+          <p:nvPr>
+            <p:ph type="ftr" sz="quarter" idx="3"/>
+          </p:nvPr>
+        </p:nvSpPr>
+        <p:spPr/>
+        <p:txBody>
+          <a:bodyPr/>
+          <a:lstStyle/>
+          <a:p>
+            <a:r>
+              <a:rPr lang="en-US" smtClean="0"/>
+              <a:t>Nested Data Structures: Arrays and Hashes</a:t>
+            </a:r>
+            <a:endParaRPr lang="en-US" dirty="0"/>
+          </a:p>
+        </p:txBody>
+      </p:sp>
+      <p:sp>
+        <p:nvSpPr>
+          <p:cNvPr id="8" name="Right Arrow 7"/>
           <p:cNvSpPr/>
           <p:nvPr/>
         </p:nvSpPr>
         <p:spPr>
           <a:xfrm>
-            <a:off x="1836163" y="1766546"/>
-            <a:ext cx="5471674" cy="3282730"/>
+            <a:off x="3155207" y="2725365"/>
+            <a:ext cx="2311865" cy="1396431"/>
           </a:xfrm>
           <a:prstGeom prst="rightArrow">
             <a:avLst/>
@@ -9778,230 +10002,6 @@
           <a:p>
             <a:pPr algn="ctr"/>
             <a:endParaRPr lang="en-US"/>
-          </a:p>
-        </p:txBody>
-      </p:sp>
-      <p:sp>
-        <p:nvSpPr>
-          <p:cNvPr id="2" name="Title 1"/>
-          <p:cNvSpPr>
-            <a:spLocks noGrp="1"/>
-          </p:cNvSpPr>
-          <p:nvPr>
-            <p:ph type="title"/>
-          </p:nvPr>
-        </p:nvSpPr>
-        <p:spPr/>
-        <p:txBody>
-          <a:bodyPr/>
-          <a:lstStyle/>
-          <a:p>
-            <a:r>
-              <a:rPr lang="en-US" dirty="0" smtClean="0"/>
-              <a:t>Creating the Structure</a:t>
-            </a:r>
-            <a:endParaRPr lang="en-US" dirty="0"/>
-          </a:p>
-        </p:txBody>
-      </p:sp>
-      <p:sp>
-        <p:nvSpPr>
-          <p:cNvPr id="5" name="Content Placeholder 4"/>
-          <p:cNvSpPr>
-            <a:spLocks noGrp="1"/>
-          </p:cNvSpPr>
-          <p:nvPr>
-            <p:ph sz="half" idx="1"/>
-          </p:nvPr>
-        </p:nvSpPr>
-        <p:spPr>
-          <a:xfrm>
-            <a:off x="1104458" y="1865377"/>
-            <a:ext cx="2245733" cy="4158166"/>
-          </a:xfrm>
-        </p:spPr>
-        <p:txBody>
-          <a:bodyPr/>
-          <a:lstStyle/>
-          <a:p>
-            <a:r>
-              <a:rPr lang="en-US" dirty="0" smtClean="0"/>
-              <a:t>provided =</a:t>
-            </a:r>
-          </a:p>
-          <a:p>
-            <a:endParaRPr lang="en-US" dirty="0"/>
-          </a:p>
-          <a:p>
-            <a:r>
-              <a:rPr lang="en-US" dirty="0" smtClean="0"/>
-              <a:t>[ [:a, :b, :c],</a:t>
-            </a:r>
-          </a:p>
-          <a:p>
-            <a:r>
-              <a:rPr lang="en-US" dirty="0"/>
-              <a:t> </a:t>
-            </a:r>
-            <a:r>
-              <a:rPr lang="en-US" dirty="0" smtClean="0"/>
-              <a:t> [:d, :e, :f],</a:t>
-            </a:r>
-          </a:p>
-          <a:p>
-            <a:r>
-              <a:rPr lang="en-US" dirty="0"/>
-              <a:t> </a:t>
-            </a:r>
-            <a:r>
-              <a:rPr lang="en-US" dirty="0" smtClean="0"/>
-              <a:t> [:g, :h, :</a:t>
-            </a:r>
-            <a:r>
-              <a:rPr lang="en-US" dirty="0" err="1"/>
-              <a:t>i</a:t>
-            </a:r>
-            <a:r>
-              <a:rPr lang="en-US" dirty="0" smtClean="0"/>
-              <a:t>],</a:t>
-            </a:r>
-          </a:p>
-          <a:p>
-            <a:r>
-              <a:rPr lang="en-US" dirty="0"/>
-              <a:t> </a:t>
-            </a:r>
-            <a:r>
-              <a:rPr lang="en-US" dirty="0" smtClean="0"/>
-              <a:t> [:j, :k, :l],</a:t>
-            </a:r>
-          </a:p>
-          <a:p>
-            <a:r>
-              <a:rPr lang="en-US" dirty="0"/>
-              <a:t> </a:t>
-            </a:r>
-            <a:r>
-              <a:rPr lang="en-US" dirty="0" smtClean="0"/>
-              <a:t> [:m, :n, :o],</a:t>
-            </a:r>
-          </a:p>
-          <a:p>
-            <a:r>
-              <a:rPr lang="en-US" dirty="0"/>
-              <a:t> </a:t>
-            </a:r>
-            <a:r>
-              <a:rPr lang="en-US" dirty="0" smtClean="0"/>
-              <a:t> [:p, :q, :r],</a:t>
-            </a:r>
-          </a:p>
-          <a:p>
-            <a:r>
-              <a:rPr lang="en-US" dirty="0" smtClean="0"/>
-              <a:t>  [:s, :t, :u],</a:t>
-            </a:r>
-          </a:p>
-          <a:p>
-            <a:r>
-              <a:rPr lang="en-US" dirty="0"/>
-              <a:t> </a:t>
-            </a:r>
-            <a:r>
-              <a:rPr lang="en-US" dirty="0" smtClean="0"/>
-              <a:t> [:v, :w, :x],</a:t>
-            </a:r>
-          </a:p>
-          <a:p>
-            <a:r>
-              <a:rPr lang="en-US" dirty="0"/>
-              <a:t> </a:t>
-            </a:r>
-            <a:r>
-              <a:rPr lang="en-US" dirty="0" smtClean="0"/>
-              <a:t> [:y, :z, :A] ] </a:t>
-            </a:r>
-            <a:endParaRPr lang="en-US" dirty="0"/>
-          </a:p>
-        </p:txBody>
-      </p:sp>
-      <p:sp>
-        <p:nvSpPr>
-          <p:cNvPr id="6" name="Content Placeholder 5"/>
-          <p:cNvSpPr>
-            <a:spLocks noGrp="1"/>
-          </p:cNvSpPr>
-          <p:nvPr>
-            <p:ph sz="half" idx="2"/>
-          </p:nvPr>
-        </p:nvSpPr>
-        <p:spPr>
-          <a:xfrm>
-            <a:off x="5467072" y="1865377"/>
-            <a:ext cx="2566525" cy="4158166"/>
-          </a:xfrm>
-        </p:spPr>
-        <p:txBody>
-          <a:bodyPr/>
-          <a:lstStyle/>
-          <a:p>
-            <a:r>
-              <a:rPr lang="en-US" dirty="0" smtClean="0"/>
-              <a:t>desired =</a:t>
-            </a:r>
-          </a:p>
-          <a:p>
-            <a:endParaRPr lang="en-US" dirty="0" smtClean="0"/>
-          </a:p>
-          <a:p>
-            <a:r>
-              <a:rPr lang="en-US" dirty="0" smtClean="0"/>
-              <a:t>[ [nil, nil, nil],</a:t>
-            </a:r>
-          </a:p>
-          <a:p>
-            <a:r>
-              <a:rPr lang="en-US" dirty="0"/>
-              <a:t> </a:t>
-            </a:r>
-            <a:r>
-              <a:rPr lang="en-US" dirty="0" smtClean="0"/>
-              <a:t> [nil, nil, nil],</a:t>
-            </a:r>
-          </a:p>
-          <a:p>
-            <a:r>
-              <a:rPr lang="en-US" dirty="0"/>
-              <a:t> </a:t>
-            </a:r>
-            <a:r>
-              <a:rPr lang="en-US" dirty="0" smtClean="0"/>
-              <a:t> [nil, nil, nil] ]</a:t>
-            </a:r>
-            <a:endParaRPr lang="en-US" dirty="0"/>
-          </a:p>
-        </p:txBody>
-      </p:sp>
-      <p:sp>
-        <p:nvSpPr>
-          <p:cNvPr id="4" name="Footer Placeholder 3"/>
-          <p:cNvSpPr>
-            <a:spLocks noGrp="1"/>
-          </p:cNvSpPr>
-          <p:nvPr>
-            <p:ph type="ftr" sz="quarter" idx="3"/>
-          </p:nvPr>
-        </p:nvSpPr>
-        <p:spPr/>
-        <p:txBody>
-          <a:bodyPr/>
-          <a:lstStyle/>
-          <a:p>
-            <a:r>
-              <a:rPr lang="en-US" smtClean="0"/>
-              <a:t>Nested Data Structures: Arrays and Hashes</a:t>
-            </a:r>
-            <a:endParaRPr lang="en-US" dirty="0"/>
           </a:p>
         </p:txBody>
       </p:sp>
@@ -10044,14 +10044,370 @@
       </p:grpSpPr>
       <p:sp>
         <p:nvSpPr>
-          <p:cNvPr id="7" name="Right Arrow 6"/>
+          <p:cNvPr id="2" name="Title 1"/>
+          <p:cNvSpPr>
+            <a:spLocks noGrp="1"/>
+          </p:cNvSpPr>
+          <p:nvPr>
+            <p:ph type="title"/>
+          </p:nvPr>
+        </p:nvSpPr>
+        <p:spPr/>
+        <p:txBody>
+          <a:bodyPr/>
+          <a:lstStyle/>
+          <a:p>
+            <a:r>
+              <a:rPr lang="en-US" dirty="0" smtClean="0"/>
+              <a:t>Creating the Structure</a:t>
+            </a:r>
+            <a:endParaRPr lang="en-US" dirty="0"/>
+          </a:p>
+        </p:txBody>
+      </p:sp>
+      <p:sp>
+        <p:nvSpPr>
+          <p:cNvPr id="5" name="Content Placeholder 4"/>
+          <p:cNvSpPr>
+            <a:spLocks noGrp="1"/>
+          </p:cNvSpPr>
+          <p:nvPr>
+            <p:ph sz="half" idx="1"/>
+          </p:nvPr>
+        </p:nvSpPr>
+        <p:spPr>
+          <a:xfrm>
+            <a:off x="1104458" y="1865377"/>
+            <a:ext cx="2245733" cy="4158166"/>
+          </a:xfrm>
+        </p:spPr>
+        <p:txBody>
+          <a:bodyPr/>
+          <a:lstStyle/>
+          <a:p>
+            <a:r>
+              <a:rPr lang="en-US" dirty="0" smtClean="0"/>
+              <a:t>provided =</a:t>
+            </a:r>
+          </a:p>
+          <a:p>
+            <a:endParaRPr lang="en-US" dirty="0"/>
+          </a:p>
+          <a:p>
+            <a:r>
+              <a:rPr lang="en-US" dirty="0" smtClean="0"/>
+              <a:t>[ [</a:t>
+            </a:r>
+            <a:r>
+              <a:rPr lang="en-US" dirty="0" smtClean="0">
+                <a:solidFill>
+                  <a:srgbClr val="EA4A3C"/>
+                </a:solidFill>
+              </a:rPr>
+              <a:t>:a</a:t>
+            </a:r>
+            <a:r>
+              <a:rPr lang="en-US" dirty="0" smtClean="0"/>
+              <a:t>, :b, :c],</a:t>
+            </a:r>
+          </a:p>
+          <a:p>
+            <a:r>
+              <a:rPr lang="en-US" dirty="0"/>
+              <a:t> </a:t>
+            </a:r>
+            <a:r>
+              <a:rPr lang="en-US" dirty="0" smtClean="0"/>
+              <a:t> [:d, </a:t>
+            </a:r>
+            <a:r>
+              <a:rPr lang="en-US" dirty="0" smtClean="0">
+                <a:solidFill>
+                  <a:srgbClr val="EA4A3C"/>
+                </a:solidFill>
+              </a:rPr>
+              <a:t>:e</a:t>
+            </a:r>
+            <a:r>
+              <a:rPr lang="en-US" dirty="0" smtClean="0"/>
+              <a:t>, :f],</a:t>
+            </a:r>
+          </a:p>
+          <a:p>
+            <a:r>
+              <a:rPr lang="en-US" dirty="0"/>
+              <a:t> </a:t>
+            </a:r>
+            <a:r>
+              <a:rPr lang="en-US" dirty="0" smtClean="0"/>
+              <a:t> [</a:t>
+            </a:r>
+            <a:r>
+              <a:rPr lang="en-US" dirty="0" smtClean="0">
+                <a:solidFill>
+                  <a:srgbClr val="EA4A3C"/>
+                </a:solidFill>
+              </a:rPr>
+              <a:t>:g</a:t>
+            </a:r>
+            <a:r>
+              <a:rPr lang="en-US" dirty="0" smtClean="0"/>
+              <a:t>, :h, :</a:t>
+            </a:r>
+            <a:r>
+              <a:rPr lang="en-US" dirty="0" err="1"/>
+              <a:t>i</a:t>
+            </a:r>
+            <a:r>
+              <a:rPr lang="en-US" dirty="0" smtClean="0"/>
+              <a:t>],</a:t>
+            </a:r>
+          </a:p>
+          <a:p>
+            <a:r>
+              <a:rPr lang="en-US" dirty="0"/>
+              <a:t> </a:t>
+            </a:r>
+            <a:r>
+              <a:rPr lang="en-US" dirty="0" smtClean="0"/>
+              <a:t> [:j, :k, </a:t>
+            </a:r>
+            <a:r>
+              <a:rPr lang="en-US" dirty="0" smtClean="0">
+                <a:solidFill>
+                  <a:srgbClr val="EA4A3C"/>
+                </a:solidFill>
+              </a:rPr>
+              <a:t>:l</a:t>
+            </a:r>
+            <a:r>
+              <a:rPr lang="en-US" dirty="0" smtClean="0"/>
+              <a:t>],</a:t>
+            </a:r>
+          </a:p>
+          <a:p>
+            <a:r>
+              <a:rPr lang="en-US" dirty="0"/>
+              <a:t> </a:t>
+            </a:r>
+            <a:r>
+              <a:rPr lang="en-US" dirty="0" smtClean="0"/>
+              <a:t> [:m, </a:t>
+            </a:r>
+            <a:r>
+              <a:rPr lang="en-US" dirty="0" smtClean="0">
+                <a:solidFill>
+                  <a:srgbClr val="EA4A3C"/>
+                </a:solidFill>
+              </a:rPr>
+              <a:t>:n</a:t>
+            </a:r>
+            <a:r>
+              <a:rPr lang="en-US" dirty="0" smtClean="0"/>
+              <a:t>, :o],</a:t>
+            </a:r>
+          </a:p>
+          <a:p>
+            <a:r>
+              <a:rPr lang="en-US" dirty="0"/>
+              <a:t> </a:t>
+            </a:r>
+            <a:r>
+              <a:rPr lang="en-US" dirty="0" smtClean="0"/>
+              <a:t> [:p, </a:t>
+            </a:r>
+            <a:r>
+              <a:rPr lang="en-US" dirty="0" smtClean="0">
+                <a:solidFill>
+                  <a:srgbClr val="EA4A3C"/>
+                </a:solidFill>
+              </a:rPr>
+              <a:t>:q</a:t>
+            </a:r>
+            <a:r>
+              <a:rPr lang="en-US" dirty="0" smtClean="0"/>
+              <a:t>, :r],</a:t>
+            </a:r>
+          </a:p>
+          <a:p>
+            <a:r>
+              <a:rPr lang="en-US" dirty="0" smtClean="0"/>
+              <a:t>  [:s, </a:t>
+            </a:r>
+            <a:r>
+              <a:rPr lang="en-US" dirty="0" smtClean="0">
+                <a:solidFill>
+                  <a:srgbClr val="EA4A3C"/>
+                </a:solidFill>
+              </a:rPr>
+              <a:t>:t</a:t>
+            </a:r>
+            <a:r>
+              <a:rPr lang="en-US" dirty="0" smtClean="0"/>
+              <a:t>, :u],</a:t>
+            </a:r>
+          </a:p>
+          <a:p>
+            <a:r>
+              <a:rPr lang="en-US" dirty="0"/>
+              <a:t> </a:t>
+            </a:r>
+            <a:r>
+              <a:rPr lang="en-US" dirty="0" smtClean="0"/>
+              <a:t> [:v, </a:t>
+            </a:r>
+            <a:r>
+              <a:rPr lang="en-US" dirty="0" smtClean="0">
+                <a:solidFill>
+                  <a:srgbClr val="EA4A3C"/>
+                </a:solidFill>
+              </a:rPr>
+              <a:t>:w</a:t>
+            </a:r>
+            <a:r>
+              <a:rPr lang="en-US" dirty="0" smtClean="0"/>
+              <a:t>, :x],</a:t>
+            </a:r>
+          </a:p>
+          <a:p>
+            <a:r>
+              <a:rPr lang="en-US" dirty="0"/>
+              <a:t> </a:t>
+            </a:r>
+            <a:r>
+              <a:rPr lang="en-US" dirty="0" smtClean="0"/>
+              <a:t> [:y, </a:t>
+            </a:r>
+            <a:r>
+              <a:rPr lang="en-US" dirty="0" smtClean="0">
+                <a:solidFill>
+                  <a:srgbClr val="EA4A3C"/>
+                </a:solidFill>
+              </a:rPr>
+              <a:t>:z</a:t>
+            </a:r>
+            <a:r>
+              <a:rPr lang="en-US" dirty="0" smtClean="0"/>
+              <a:t>, :A] ] </a:t>
+            </a:r>
+            <a:endParaRPr lang="en-US" dirty="0"/>
+          </a:p>
+        </p:txBody>
+      </p:sp>
+      <p:sp>
+        <p:nvSpPr>
+          <p:cNvPr id="6" name="Content Placeholder 5"/>
+          <p:cNvSpPr>
+            <a:spLocks noGrp="1"/>
+          </p:cNvSpPr>
+          <p:nvPr>
+            <p:ph sz="half" idx="2"/>
+          </p:nvPr>
+        </p:nvSpPr>
+        <p:spPr>
+          <a:xfrm>
+            <a:off x="5467072" y="1865377"/>
+            <a:ext cx="2566525" cy="4158166"/>
+          </a:xfrm>
+        </p:spPr>
+        <p:txBody>
+          <a:bodyPr/>
+          <a:lstStyle/>
+          <a:p>
+            <a:r>
+              <a:rPr lang="en-US" dirty="0" smtClean="0"/>
+              <a:t>desired =</a:t>
+            </a:r>
+          </a:p>
+          <a:p>
+            <a:endParaRPr lang="en-US" dirty="0" smtClean="0"/>
+          </a:p>
+          <a:p>
+            <a:r>
+              <a:rPr lang="en-US" dirty="0" smtClean="0">
+                <a:solidFill>
+                  <a:srgbClr val="FF0000"/>
+                </a:solidFill>
+              </a:rPr>
+              <a:t>[ [:a, :e, :g],</a:t>
+            </a:r>
+          </a:p>
+          <a:p>
+            <a:r>
+              <a:rPr lang="en-US" dirty="0">
+                <a:solidFill>
+                  <a:srgbClr val="FF0000"/>
+                </a:solidFill>
+              </a:rPr>
+              <a:t> </a:t>
+            </a:r>
+            <a:r>
+              <a:rPr lang="en-US" dirty="0" smtClean="0">
+                <a:solidFill>
+                  <a:srgbClr val="FF0000"/>
+                </a:solidFill>
+              </a:rPr>
+              <a:t> [:l, :n, :q],</a:t>
+            </a:r>
+          </a:p>
+          <a:p>
+            <a:r>
+              <a:rPr lang="en-US" dirty="0">
+                <a:solidFill>
+                  <a:srgbClr val="FF0000"/>
+                </a:solidFill>
+              </a:rPr>
+              <a:t> </a:t>
+            </a:r>
+            <a:r>
+              <a:rPr lang="en-US" dirty="0" smtClean="0">
+                <a:solidFill>
+                  <a:srgbClr val="FF0000"/>
+                </a:solidFill>
+              </a:rPr>
+              <a:t> [:t, :w, :z] ]</a:t>
+            </a:r>
+            <a:endParaRPr lang="en-US" dirty="0">
+              <a:solidFill>
+                <a:srgbClr val="FF0000"/>
+              </a:solidFill>
+            </a:endParaRPr>
+          </a:p>
+        </p:txBody>
+      </p:sp>
+      <p:sp>
+        <p:nvSpPr>
+          <p:cNvPr id="4" name="Footer Placeholder 3"/>
+          <p:cNvSpPr>
+            <a:spLocks noGrp="1"/>
+          </p:cNvSpPr>
+          <p:nvPr>
+            <p:ph type="ftr" sz="quarter" idx="3"/>
+          </p:nvPr>
+        </p:nvSpPr>
+        <p:spPr/>
+        <p:txBody>
+          <a:bodyPr/>
+          <a:lstStyle/>
+          <a:p>
+            <a:r>
+              <a:rPr lang="en-US" smtClean="0"/>
+              <a:t>Nested Data Structures: Arrays and Hashes</a:t>
+            </a:r>
+            <a:endParaRPr lang="en-US" dirty="0"/>
+          </a:p>
+        </p:txBody>
+      </p:sp>
+      <p:sp>
+        <p:nvSpPr>
+          <p:cNvPr id="8" name="Right Arrow 7"/>
           <p:cNvSpPr/>
           <p:nvPr/>
         </p:nvSpPr>
         <p:spPr>
           <a:xfrm>
-            <a:off x="1836163" y="1766546"/>
-            <a:ext cx="5471674" cy="3282730"/>
+            <a:off x="3155207" y="2725365"/>
+            <a:ext cx="2311865" cy="1396431"/>
           </a:xfrm>
           <a:prstGeom prst="rightArrow">
             <a:avLst/>
@@ -10087,362 +10443,6 @@
           <a:p>
             <a:pPr algn="ctr"/>
             <a:endParaRPr lang="en-US"/>
-          </a:p>
-        </p:txBody>
-      </p:sp>
-      <p:sp>
-        <p:nvSpPr>
-          <p:cNvPr id="2" name="Title 1"/>
-          <p:cNvSpPr>
-            <a:spLocks noGrp="1"/>
-          </p:cNvSpPr>
-          <p:nvPr>
-            <p:ph type="title"/>
-          </p:nvPr>
-        </p:nvSpPr>
-        <p:spPr/>
-        <p:txBody>
-          <a:bodyPr/>
-          <a:lstStyle/>
-          <a:p>
-            <a:r>
-              <a:rPr lang="en-US" dirty="0" smtClean="0"/>
-              <a:t>Creating the Structure</a:t>
-            </a:r>
-            <a:endParaRPr lang="en-US" dirty="0"/>
-          </a:p>
-        </p:txBody>
-      </p:sp>
-      <p:sp>
-        <p:nvSpPr>
-          <p:cNvPr id="5" name="Content Placeholder 4"/>
-          <p:cNvSpPr>
-            <a:spLocks noGrp="1"/>
-          </p:cNvSpPr>
-          <p:nvPr>
-            <p:ph sz="half" idx="1"/>
-          </p:nvPr>
-        </p:nvSpPr>
-        <p:spPr>
-          <a:xfrm>
-            <a:off x="1104458" y="1865377"/>
-            <a:ext cx="2245733" cy="4158166"/>
-          </a:xfrm>
-        </p:spPr>
-        <p:txBody>
-          <a:bodyPr/>
-          <a:lstStyle/>
-          <a:p>
-            <a:r>
-              <a:rPr lang="en-US" dirty="0" smtClean="0"/>
-              <a:t>provided =</a:t>
-            </a:r>
-          </a:p>
-          <a:p>
-            <a:endParaRPr lang="en-US" dirty="0"/>
-          </a:p>
-          <a:p>
-            <a:r>
-              <a:rPr lang="en-US" dirty="0" smtClean="0"/>
-              <a:t>[ [</a:t>
-            </a:r>
-            <a:r>
-              <a:rPr lang="en-US" dirty="0" smtClean="0">
-                <a:solidFill>
-                  <a:srgbClr val="EA4A3C"/>
-                </a:solidFill>
-              </a:rPr>
-              <a:t>:a</a:t>
-            </a:r>
-            <a:r>
-              <a:rPr lang="en-US" dirty="0" smtClean="0"/>
-              <a:t>, :b, :c],</a:t>
-            </a:r>
-          </a:p>
-          <a:p>
-            <a:r>
-              <a:rPr lang="en-US" dirty="0"/>
-              <a:t> </a:t>
-            </a:r>
-            <a:r>
-              <a:rPr lang="en-US" dirty="0" smtClean="0"/>
-              <a:t> [:d, </a:t>
-            </a:r>
-            <a:r>
-              <a:rPr lang="en-US" dirty="0" smtClean="0">
-                <a:solidFill>
-                  <a:srgbClr val="EA4A3C"/>
-                </a:solidFill>
-              </a:rPr>
-              <a:t>:e</a:t>
-            </a:r>
-            <a:r>
-              <a:rPr lang="en-US" dirty="0" smtClean="0"/>
-              <a:t>, :f],</a:t>
-            </a:r>
-          </a:p>
-          <a:p>
-            <a:r>
-              <a:rPr lang="en-US" dirty="0"/>
-              <a:t> </a:t>
-            </a:r>
-            <a:r>
-              <a:rPr lang="en-US" dirty="0" smtClean="0"/>
-              <a:t> [</a:t>
-            </a:r>
-            <a:r>
-              <a:rPr lang="en-US" dirty="0" smtClean="0">
-                <a:solidFill>
-                  <a:srgbClr val="EA4A3C"/>
-                </a:solidFill>
-              </a:rPr>
-              <a:t>:g</a:t>
-            </a:r>
-            <a:r>
-              <a:rPr lang="en-US" dirty="0" smtClean="0"/>
-              <a:t>, :h, :</a:t>
-            </a:r>
-            <a:r>
-              <a:rPr lang="en-US" dirty="0" err="1"/>
-              <a:t>i</a:t>
-            </a:r>
-            <a:r>
-              <a:rPr lang="en-US" dirty="0" smtClean="0"/>
-              <a:t>],</a:t>
-            </a:r>
-          </a:p>
-          <a:p>
-            <a:r>
-              <a:rPr lang="en-US" dirty="0"/>
-              <a:t> </a:t>
-            </a:r>
-            <a:r>
-              <a:rPr lang="en-US" dirty="0" smtClean="0"/>
-              <a:t> [:j, :k, </a:t>
-            </a:r>
-            <a:r>
-              <a:rPr lang="en-US" dirty="0" smtClean="0">
-                <a:solidFill>
-                  <a:srgbClr val="EA4A3C"/>
-                </a:solidFill>
-              </a:rPr>
-              <a:t>:l</a:t>
-            </a:r>
-            <a:r>
-              <a:rPr lang="en-US" dirty="0" smtClean="0"/>
-              <a:t>],</a:t>
-            </a:r>
-          </a:p>
-          <a:p>
-            <a:r>
-              <a:rPr lang="en-US" dirty="0"/>
-              <a:t> </a:t>
-            </a:r>
-            <a:r>
-              <a:rPr lang="en-US" dirty="0" smtClean="0"/>
-              <a:t> [:m, </a:t>
-            </a:r>
-            <a:r>
-              <a:rPr lang="en-US" dirty="0" smtClean="0">
-                <a:solidFill>
-                  <a:srgbClr val="EA4A3C"/>
-                </a:solidFill>
-              </a:rPr>
-              <a:t>:n</a:t>
-            </a:r>
-            <a:r>
-              <a:rPr lang="en-US" dirty="0" smtClean="0"/>
-              <a:t>, :o],</a:t>
-            </a:r>
-          </a:p>
-          <a:p>
-            <a:r>
-              <a:rPr lang="en-US" dirty="0"/>
-              <a:t> </a:t>
-            </a:r>
-            <a:r>
-              <a:rPr lang="en-US" dirty="0" smtClean="0"/>
-              <a:t> [:p, </a:t>
-            </a:r>
-            <a:r>
-              <a:rPr lang="en-US" dirty="0" smtClean="0">
-                <a:solidFill>
-                  <a:srgbClr val="EA4A3C"/>
-                </a:solidFill>
-              </a:rPr>
-              <a:t>:q</a:t>
-            </a:r>
-            <a:r>
-              <a:rPr lang="en-US" dirty="0" smtClean="0"/>
-              <a:t>, :r],</a:t>
-            </a:r>
-          </a:p>
-          <a:p>
-            <a:r>
-              <a:rPr lang="en-US" dirty="0" smtClean="0"/>
-              <a:t>  [:s, </a:t>
-            </a:r>
-            <a:r>
-              <a:rPr lang="en-US" dirty="0" smtClean="0">
-                <a:solidFill>
-                  <a:srgbClr val="EA4A3C"/>
-                </a:solidFill>
-              </a:rPr>
-              <a:t>:t</a:t>
-            </a:r>
-            <a:r>
-              <a:rPr lang="en-US" dirty="0" smtClean="0"/>
-              <a:t>, :u],</a:t>
-            </a:r>
-          </a:p>
-          <a:p>
-            <a:r>
-              <a:rPr lang="en-US" dirty="0"/>
-              <a:t> </a:t>
-            </a:r>
-            <a:r>
-              <a:rPr lang="en-US" dirty="0" smtClean="0"/>
-              <a:t> [:v, </a:t>
-            </a:r>
-            <a:r>
-              <a:rPr lang="en-US" dirty="0" smtClean="0">
-                <a:solidFill>
-                  <a:srgbClr val="EA4A3C"/>
-                </a:solidFill>
-              </a:rPr>
-              <a:t>:w</a:t>
-            </a:r>
-            <a:r>
-              <a:rPr lang="en-US" dirty="0" smtClean="0"/>
-              <a:t>, :x],</a:t>
-            </a:r>
-          </a:p>
-          <a:p>
-            <a:r>
-              <a:rPr lang="en-US" dirty="0"/>
-              <a:t> </a:t>
-            </a:r>
-            <a:r>
-              <a:rPr lang="en-US" dirty="0" smtClean="0"/>
-              <a:t> [:y, </a:t>
-            </a:r>
-            <a:r>
-              <a:rPr lang="en-US" dirty="0" smtClean="0">
-                <a:solidFill>
-                  <a:srgbClr val="EA4A3C"/>
-                </a:solidFill>
-              </a:rPr>
-              <a:t>:z</a:t>
-            </a:r>
-            <a:r>
-              <a:rPr lang="en-US" dirty="0" smtClean="0"/>
-              <a:t>, :A] ] </a:t>
-            </a:r>
-            <a:endParaRPr lang="en-US" dirty="0"/>
-          </a:p>
-        </p:txBody>
-      </p:sp>
-      <p:sp>
-        <p:nvSpPr>
-          <p:cNvPr id="6" name="Content Placeholder 5"/>
-          <p:cNvSpPr>
-            <a:spLocks noGrp="1"/>
-          </p:cNvSpPr>
-          <p:nvPr>
-            <p:ph sz="half" idx="2"/>
-          </p:nvPr>
-        </p:nvSpPr>
-        <p:spPr>
-          <a:xfrm>
-            <a:off x="5467072" y="1865377"/>
-            <a:ext cx="2566525" cy="4158166"/>
-          </a:xfrm>
-        </p:spPr>
-        <p:txBody>
-          <a:bodyPr/>
-          <a:lstStyle/>
-          <a:p>
-            <a:r>
-              <a:rPr lang="en-US" dirty="0" smtClean="0"/>
-              <a:t>desired =</a:t>
-            </a:r>
-          </a:p>
-          <a:p>
-            <a:endParaRPr lang="en-US" dirty="0" smtClean="0"/>
-          </a:p>
-          <a:p>
-            <a:r>
-              <a:rPr lang="en-US" dirty="0" smtClean="0">
-                <a:solidFill>
-                  <a:srgbClr val="FF0000"/>
-                </a:solidFill>
-              </a:rPr>
-              <a:t>[ [:a, :e, :g],</a:t>
-            </a:r>
-          </a:p>
-          <a:p>
-            <a:r>
-              <a:rPr lang="en-US" dirty="0">
-                <a:solidFill>
-                  <a:srgbClr val="FF0000"/>
-                </a:solidFill>
-              </a:rPr>
-              <a:t> </a:t>
-            </a:r>
-            <a:r>
-              <a:rPr lang="en-US" dirty="0" smtClean="0">
-                <a:solidFill>
-                  <a:srgbClr val="FF0000"/>
-                </a:solidFill>
-              </a:rPr>
-              <a:t> [:l, :n, :q],</a:t>
-            </a:r>
-          </a:p>
-          <a:p>
-            <a:r>
-              <a:rPr lang="en-US" dirty="0">
-                <a:solidFill>
-                  <a:srgbClr val="FF0000"/>
-                </a:solidFill>
-              </a:rPr>
-              <a:t> </a:t>
-            </a:r>
-            <a:r>
-              <a:rPr lang="en-US" dirty="0" smtClean="0">
-                <a:solidFill>
-                  <a:srgbClr val="FF0000"/>
-                </a:solidFill>
-              </a:rPr>
-              <a:t> [:t, :w, :z] ]</a:t>
-            </a:r>
-            <a:endParaRPr lang="en-US" dirty="0">
-              <a:solidFill>
-                <a:srgbClr val="FF0000"/>
-              </a:solidFill>
-            </a:endParaRPr>
-          </a:p>
-        </p:txBody>
-      </p:sp>
-      <p:sp>
-        <p:nvSpPr>
-          <p:cNvPr id="4" name="Footer Placeholder 3"/>
-          <p:cNvSpPr>
-            <a:spLocks noGrp="1"/>
-          </p:cNvSpPr>
-          <p:nvPr>
-            <p:ph type="ftr" sz="quarter" idx="3"/>
-          </p:nvPr>
-        </p:nvSpPr>
-        <p:spPr/>
-        <p:txBody>
-          <a:bodyPr/>
-          <a:lstStyle/>
-          <a:p>
-            <a:r>
-              <a:rPr lang="en-US" smtClean="0"/>
-              <a:t>Nested Data Structures: Arrays and Hashes</a:t>
-            </a:r>
-            <a:endParaRPr lang="en-US" dirty="0"/>
           </a:p>
         </p:txBody>
       </p:sp>
@@ -16956,7 +16956,6 @@
               <a:rPr lang="en-US" dirty="0" smtClean="0"/>
               <a:t>}},</a:t>
             </a:r>
-            <a:endParaRPr lang="en-US" dirty="0" smtClean="0"/>
           </a:p>
           <a:p>
             <a:endParaRPr lang="en-US" dirty="0"/>
@@ -16986,7 +16985,6 @@
               <a:rPr lang="en-US" dirty="0" smtClean="0"/>
               <a:t>}},</a:t>
             </a:r>
-            <a:endParaRPr lang="en-US" dirty="0" smtClean="0"/>
           </a:p>
           <a:p>
             <a:endParaRPr lang="en-US" dirty="0"/>
@@ -17016,7 +17014,6 @@
               <a:rPr lang="en-US" dirty="0" smtClean="0"/>
               <a:t>}},</a:t>
             </a:r>
-            <a:endParaRPr lang="en-US" dirty="0" smtClean="0"/>
           </a:p>
           <a:p>
             <a:endParaRPr lang="en-US" dirty="0"/>
@@ -17054,7 +17051,6 @@
               <a:rPr lang="en-US" dirty="0" smtClean="0"/>
               <a:t>}},</a:t>
             </a:r>
-            <a:endParaRPr lang="en-US" dirty="0" smtClean="0"/>
           </a:p>
           <a:p>
             <a:endParaRPr lang="en-US" dirty="0"/>
@@ -17103,7 +17099,6 @@
               <a:rPr lang="en-US" dirty="0" smtClean="0"/>
               <a:t> ]</a:t>
             </a:r>
-            <a:endParaRPr lang="en-US" dirty="0" smtClean="0"/>
           </a:p>
         </p:txBody>
       </p:sp>

</xml_diff>